<commit_message>
Adicionado slides na apresentação da 3 entrega modificado formularios do arquivo cad-pac
</commit_message>
<xml_diff>
--- a/terceira entrega/terceira entrega.pptx
+++ b/terceira entrega/terceira entrega.pptx
@@ -1401,103 +1401,19 @@
               <a:rPr b="0" lang="pt-BR" sz="4400" spc="-1" strike="noStrike">
                 <a:latin typeface="Arial"/>
               </a:rPr>
-              <a:t>Cli</a:t>
+              <a:t>Clique para editar </a:t>
             </a:r>
             <a:r>
               <a:rPr b="0" lang="pt-BR" sz="4400" spc="-1" strike="noStrike">
                 <a:latin typeface="Arial"/>
               </a:rPr>
-              <a:t>qu</a:t>
+              <a:t>o formato do texto </a:t>
             </a:r>
             <a:r>
               <a:rPr b="0" lang="pt-BR" sz="4400" spc="-1" strike="noStrike">
                 <a:latin typeface="Arial"/>
               </a:rPr>
-              <a:t>e </a:t>
-            </a:r>
-            <a:r>
-              <a:rPr b="0" lang="pt-BR" sz="4400" spc="-1" strike="noStrike">
-                <a:latin typeface="Arial"/>
-              </a:rPr>
-              <a:t>par</a:t>
-            </a:r>
-            <a:r>
-              <a:rPr b="0" lang="pt-BR" sz="4400" spc="-1" strike="noStrike">
-                <a:latin typeface="Arial"/>
-              </a:rPr>
-              <a:t>a </a:t>
-            </a:r>
-            <a:r>
-              <a:rPr b="0" lang="pt-BR" sz="4400" spc="-1" strike="noStrike">
-                <a:latin typeface="Arial"/>
-              </a:rPr>
-              <a:t>edi</a:t>
-            </a:r>
-            <a:r>
-              <a:rPr b="0" lang="pt-BR" sz="4400" spc="-1" strike="noStrike">
-                <a:latin typeface="Arial"/>
-              </a:rPr>
-              <a:t>tar </a:t>
-            </a:r>
-            <a:r>
-              <a:rPr b="0" lang="pt-BR" sz="4400" spc="-1" strike="noStrike">
-                <a:latin typeface="Arial"/>
-              </a:rPr>
-              <a:t>o </a:t>
-            </a:r>
-            <a:r>
-              <a:rPr b="0" lang="pt-BR" sz="4400" spc="-1" strike="noStrike">
-                <a:latin typeface="Arial"/>
-              </a:rPr>
-              <a:t>for</a:t>
-            </a:r>
-            <a:r>
-              <a:rPr b="0" lang="pt-BR" sz="4400" spc="-1" strike="noStrike">
-                <a:latin typeface="Arial"/>
-              </a:rPr>
-              <a:t>ma</a:t>
-            </a:r>
-            <a:r>
-              <a:rPr b="0" lang="pt-BR" sz="4400" spc="-1" strike="noStrike">
-                <a:latin typeface="Arial"/>
-              </a:rPr>
-              <a:t>to </a:t>
-            </a:r>
-            <a:r>
-              <a:rPr b="0" lang="pt-BR" sz="4400" spc="-1" strike="noStrike">
-                <a:latin typeface="Arial"/>
-              </a:rPr>
-              <a:t>do </a:t>
-            </a:r>
-            <a:r>
-              <a:rPr b="0" lang="pt-BR" sz="4400" spc="-1" strike="noStrike">
-                <a:latin typeface="Arial"/>
-              </a:rPr>
-              <a:t>tex</a:t>
-            </a:r>
-            <a:r>
-              <a:rPr b="0" lang="pt-BR" sz="4400" spc="-1" strike="noStrike">
-                <a:latin typeface="Arial"/>
-              </a:rPr>
-              <a:t>to </a:t>
-            </a:r>
-            <a:r>
-              <a:rPr b="0" lang="pt-BR" sz="4400" spc="-1" strike="noStrike">
-                <a:latin typeface="Arial"/>
-              </a:rPr>
-              <a:t>do </a:t>
-            </a:r>
-            <a:r>
-              <a:rPr b="0" lang="pt-BR" sz="4400" spc="-1" strike="noStrike">
-                <a:latin typeface="Arial"/>
-              </a:rPr>
-              <a:t>títul</a:t>
-            </a:r>
-            <a:r>
-              <a:rPr b="0" lang="pt-BR" sz="4400" spc="-1" strike="noStrike">
-                <a:latin typeface="Arial"/>
-              </a:rPr>
-              <a:t>o</a:t>
+              <a:t>do título</a:t>
             </a:r>
             <a:endParaRPr b="0" lang="pt-BR" sz="4400" spc="-1" strike="noStrike">
               <a:latin typeface="Arial"/>
@@ -2148,7 +2064,7 @@
       </p:pic>
       <p:pic>
         <p:nvPicPr>
-          <p:cNvPr id="46" name="Imagem 4" descr=""/>
+          <p:cNvPr id="46" name="Google Shape;89;p13" descr=""/>
           <p:cNvPicPr/>
           <p:nvPr/>
         </p:nvPicPr>
@@ -2158,8 +2074,8 @@
         </p:blipFill>
         <p:spPr>
           <a:xfrm>
-            <a:off x="235080" y="2050200"/>
-            <a:ext cx="11470680" cy="3800520"/>
+            <a:off x="10561680" y="0"/>
+            <a:ext cx="1081080" cy="2504880"/>
           </a:xfrm>
           <a:prstGeom prst="rect">
             <a:avLst/>
@@ -2169,9 +2085,108 @@
           </a:ln>
         </p:spPr>
       </p:pic>
+      <p:sp>
+        <p:nvSpPr>
+          <p:cNvPr id="47" name="CustomShape 3"/>
+          <p:cNvSpPr/>
+          <p:nvPr/>
+        </p:nvSpPr>
+        <p:spPr>
+          <a:xfrm>
+            <a:off x="3422160" y="1684800"/>
+            <a:ext cx="4929840" cy="1123200"/>
+          </a:xfrm>
+          <a:prstGeom prst="rect">
+            <a:avLst/>
+          </a:prstGeom>
+          <a:noFill/>
+          <a:ln>
+            <a:noFill/>
+          </a:ln>
+        </p:spPr>
+        <p:style>
+          <a:lnRef idx="0"/>
+          <a:fillRef idx="0"/>
+          <a:effectRef idx="0"/>
+          <a:fontRef idx="minor"/>
+        </p:style>
+        <p:txBody>
+          <a:bodyPr lIns="90000" rIns="90000" tIns="45000" bIns="45000"/>
+          <a:p>
+            <a:pPr algn="ctr">
+              <a:lnSpc>
+                <a:spcPct val="100000"/>
+              </a:lnSpc>
+            </a:pPr>
+            <a:r>
+              <a:rPr b="1" lang="pt-BR" sz="1800" spc="-1" strike="noStrike">
+                <a:solidFill>
+                  <a:srgbClr val="8dc641"/>
+                </a:solidFill>
+                <a:latin typeface="Arial"/>
+                <a:ea typeface="Arial"/>
+              </a:rPr>
+              <a:t>Cronograma</a:t>
+            </a:r>
+            <a:endParaRPr b="0" lang="pt-BR" sz="1800" spc="-1" strike="noStrike">
+              <a:latin typeface="Arial"/>
+            </a:endParaRPr>
+          </a:p>
+          <a:p>
+            <a:pPr algn="ctr">
+              <a:lnSpc>
+                <a:spcPct val="100000"/>
+              </a:lnSpc>
+            </a:pPr>
+            <a:endParaRPr b="0" lang="pt-BR" sz="1800" spc="-1" strike="noStrike">
+              <a:latin typeface="Arial"/>
+            </a:endParaRPr>
+          </a:p>
+          <a:p>
+            <a:pPr algn="ctr">
+              <a:lnSpc>
+                <a:spcPct val="100000"/>
+              </a:lnSpc>
+            </a:pPr>
+            <a:endParaRPr b="0" lang="pt-BR" sz="1800" spc="-1" strike="noStrike">
+              <a:latin typeface="Arial"/>
+            </a:endParaRPr>
+          </a:p>
+          <a:p>
+            <a:pPr algn="ctr">
+              <a:lnSpc>
+                <a:spcPct val="100000"/>
+              </a:lnSpc>
+            </a:pPr>
+            <a:endParaRPr b="0" lang="pt-BR" sz="1800" spc="-1" strike="noStrike">
+              <a:latin typeface="Arial"/>
+            </a:endParaRPr>
+          </a:p>
+          <a:p>
+            <a:pPr algn="ctr">
+              <a:lnSpc>
+                <a:spcPct val="100000"/>
+              </a:lnSpc>
+            </a:pPr>
+            <a:endParaRPr b="0" lang="pt-BR" sz="1800" spc="-1" strike="noStrike">
+              <a:latin typeface="Arial"/>
+            </a:endParaRPr>
+          </a:p>
+          <a:p>
+            <a:pPr algn="ctr">
+              <a:lnSpc>
+                <a:spcPct val="100000"/>
+              </a:lnSpc>
+            </a:pPr>
+            <a:endParaRPr b="0" lang="pt-BR" sz="1800" spc="-1" strike="noStrike">
+              <a:latin typeface="Arial"/>
+            </a:endParaRPr>
+          </a:p>
+        </p:txBody>
+      </p:sp>
       <p:pic>
         <p:nvPicPr>
-          <p:cNvPr id="47" name="Google Shape;89;p13" descr=""/>
+          <p:cNvPr id="48" name="" descr=""/>
           <p:cNvPicPr/>
           <p:nvPr/>
         </p:nvPicPr>
@@ -2181,8 +2196,8 @@
         </p:blipFill>
         <p:spPr>
           <a:xfrm>
-            <a:off x="10561680" y="0"/>
-            <a:ext cx="1081080" cy="2504880"/>
+            <a:off x="1512000" y="2016000"/>
+            <a:ext cx="8921160" cy="4470480"/>
           </a:xfrm>
           <a:prstGeom prst="rect">
             <a:avLst/>
@@ -2250,7 +2265,7 @@
       </p:grpSpPr>
       <p:sp>
         <p:nvSpPr>
-          <p:cNvPr id="48" name="CustomShape 1"/>
+          <p:cNvPr id="49" name="CustomShape 1"/>
           <p:cNvSpPr/>
           <p:nvPr/>
         </p:nvSpPr>
@@ -2278,7 +2293,7 @@
       </p:sp>
       <p:pic>
         <p:nvPicPr>
-          <p:cNvPr id="49" name="Google Shape;89;p13" descr=""/>
+          <p:cNvPr id="50" name="Google Shape;89;p13" descr=""/>
           <p:cNvPicPr/>
           <p:nvPr/>
         </p:nvPicPr>
@@ -2301,7 +2316,7 @@
       </p:pic>
       <p:sp>
         <p:nvSpPr>
-          <p:cNvPr id="50" name="CustomShape 2"/>
+          <p:cNvPr id="51" name="CustomShape 2"/>
           <p:cNvSpPr/>
           <p:nvPr/>
         </p:nvSpPr>
@@ -2360,7 +2375,7 @@
       </p:sp>
       <p:pic>
         <p:nvPicPr>
-          <p:cNvPr id="51" name="Google Shape;166;p39" descr=""/>
+          <p:cNvPr id="52" name="Google Shape;166;p39" descr=""/>
           <p:cNvPicPr/>
           <p:nvPr/>
         </p:nvPicPr>
@@ -2383,7 +2398,7 @@
       </p:pic>
       <p:pic>
         <p:nvPicPr>
-          <p:cNvPr id="52" name="" descr=""/>
+          <p:cNvPr id="53" name="" descr=""/>
           <p:cNvPicPr/>
           <p:nvPr/>
         </p:nvPicPr>
@@ -2393,8 +2408,8 @@
         </p:blipFill>
         <p:spPr>
           <a:xfrm>
-            <a:off x="972720" y="1627200"/>
-            <a:ext cx="9288000" cy="4843440"/>
+            <a:off x="1440000" y="1886760"/>
+            <a:ext cx="9049680" cy="4719240"/>
           </a:xfrm>
           <a:prstGeom prst="rect">
             <a:avLst/>
@@ -2404,6 +2419,55 @@
           </a:ln>
         </p:spPr>
       </p:pic>
+      <p:sp>
+        <p:nvSpPr>
+          <p:cNvPr id="54" name="CustomShape 3"/>
+          <p:cNvSpPr/>
+          <p:nvPr/>
+        </p:nvSpPr>
+        <p:spPr>
+          <a:xfrm>
+            <a:off x="3422160" y="1536840"/>
+            <a:ext cx="4929840" cy="1123200"/>
+          </a:xfrm>
+          <a:prstGeom prst="rect">
+            <a:avLst/>
+          </a:prstGeom>
+          <a:noFill/>
+          <a:ln>
+            <a:noFill/>
+          </a:ln>
+        </p:spPr>
+        <p:style>
+          <a:lnRef idx="0"/>
+          <a:fillRef idx="0"/>
+          <a:effectRef idx="0"/>
+          <a:fontRef idx="minor"/>
+        </p:style>
+        <p:txBody>
+          <a:bodyPr lIns="90000" rIns="90000" tIns="45000" bIns="45000"/>
+          <a:p>
+            <a:pPr algn="ctr">
+              <a:lnSpc>
+                <a:spcPct val="100000"/>
+              </a:lnSpc>
+            </a:pPr>
+            <a:r>
+              <a:rPr b="1" lang="pt-BR" sz="1800" spc="-1" strike="noStrike">
+                <a:solidFill>
+                  <a:srgbClr val="8dc641"/>
+                </a:solidFill>
+                <a:latin typeface="Arial"/>
+                <a:ea typeface="Arial"/>
+              </a:rPr>
+              <a:t>Tela de Login</a:t>
+            </a:r>
+            <a:endParaRPr b="0" lang="pt-BR" sz="1800" spc="-1" strike="noStrike">
+              <a:latin typeface="Arial"/>
+            </a:endParaRPr>
+          </a:p>
+        </p:txBody>
+      </p:sp>
     </p:spTree>
   </p:cSld>
   <p:timing>
@@ -2462,7 +2526,7 @@
       </p:grpSpPr>
       <p:pic>
         <p:nvPicPr>
-          <p:cNvPr id="53" name="" descr=""/>
+          <p:cNvPr id="55" name="" descr=""/>
           <p:cNvPicPr/>
           <p:nvPr/>
         </p:nvPicPr>
@@ -2472,7 +2536,7 @@
         </p:blipFill>
         <p:spPr>
           <a:xfrm>
-            <a:off x="1080000" y="1843920"/>
+            <a:off x="1080000" y="1987920"/>
             <a:ext cx="10440000" cy="4276080"/>
           </a:xfrm>
           <a:prstGeom prst="rect">
@@ -2485,7 +2549,7 @@
       </p:pic>
       <p:sp>
         <p:nvSpPr>
-          <p:cNvPr id="54" name="CustomShape 1"/>
+          <p:cNvPr id="56" name="CustomShape 1"/>
           <p:cNvSpPr/>
           <p:nvPr/>
         </p:nvSpPr>
@@ -2513,7 +2577,7 @@
       </p:sp>
       <p:pic>
         <p:nvPicPr>
-          <p:cNvPr id="55" name="Google Shape;89;p13" descr=""/>
+          <p:cNvPr id="57" name="Google Shape;89;p13" descr=""/>
           <p:cNvPicPr/>
           <p:nvPr/>
         </p:nvPicPr>
@@ -2536,7 +2600,7 @@
       </p:pic>
       <p:sp>
         <p:nvSpPr>
-          <p:cNvPr id="56" name="CustomShape 2"/>
+          <p:cNvPr id="58" name="CustomShape 2"/>
           <p:cNvSpPr/>
           <p:nvPr/>
         </p:nvSpPr>
@@ -2595,7 +2659,7 @@
       </p:sp>
       <p:pic>
         <p:nvPicPr>
-          <p:cNvPr id="57" name="Google Shape;166;p39" descr=""/>
+          <p:cNvPr id="59" name="Google Shape;166;p39" descr=""/>
           <p:cNvPicPr/>
           <p:nvPr/>
         </p:nvPicPr>
@@ -2616,6 +2680,115 @@
           </a:ln>
         </p:spPr>
       </p:pic>
+      <p:sp>
+        <p:nvSpPr>
+          <p:cNvPr id="60" name="CustomShape 3"/>
+          <p:cNvSpPr/>
+          <p:nvPr/>
+        </p:nvSpPr>
+        <p:spPr>
+          <a:xfrm>
+            <a:off x="3494160" y="1540800"/>
+            <a:ext cx="4929840" cy="1123200"/>
+          </a:xfrm>
+          <a:prstGeom prst="rect">
+            <a:avLst/>
+          </a:prstGeom>
+          <a:noFill/>
+          <a:ln>
+            <a:noFill/>
+          </a:ln>
+        </p:spPr>
+        <p:style>
+          <a:lnRef idx="0"/>
+          <a:fillRef idx="0"/>
+          <a:effectRef idx="0"/>
+          <a:fontRef idx="minor"/>
+        </p:style>
+        <p:txBody>
+          <a:bodyPr lIns="90000" rIns="90000" tIns="45000" bIns="45000"/>
+          <a:p>
+            <a:pPr algn="ctr">
+              <a:lnSpc>
+                <a:spcPct val="100000"/>
+              </a:lnSpc>
+            </a:pPr>
+            <a:r>
+              <a:rPr b="1" lang="pt-BR" sz="1800" spc="-1" strike="noStrike">
+                <a:solidFill>
+                  <a:srgbClr val="8dc641"/>
+                </a:solidFill>
+                <a:latin typeface="Arial"/>
+                <a:ea typeface="Arial"/>
+              </a:rPr>
+              <a:t>Dashboard</a:t>
+            </a:r>
+            <a:endParaRPr b="0" lang="pt-BR" sz="1800" spc="-1" strike="noStrike">
+              <a:latin typeface="Arial"/>
+            </a:endParaRPr>
+          </a:p>
+          <a:p>
+            <a:pPr algn="ctr">
+              <a:lnSpc>
+                <a:spcPct val="100000"/>
+              </a:lnSpc>
+            </a:pPr>
+            <a:endParaRPr b="0" lang="pt-BR" sz="1800" spc="-1" strike="noStrike">
+              <a:latin typeface="Arial"/>
+            </a:endParaRPr>
+          </a:p>
+          <a:p>
+            <a:pPr algn="ctr">
+              <a:lnSpc>
+                <a:spcPct val="100000"/>
+              </a:lnSpc>
+            </a:pPr>
+            <a:endParaRPr b="0" lang="pt-BR" sz="1800" spc="-1" strike="noStrike">
+              <a:latin typeface="Arial"/>
+            </a:endParaRPr>
+          </a:p>
+          <a:p>
+            <a:pPr algn="ctr">
+              <a:lnSpc>
+                <a:spcPct val="100000"/>
+              </a:lnSpc>
+            </a:pPr>
+            <a:endParaRPr b="0" lang="pt-BR" sz="1800" spc="-1" strike="noStrike">
+              <a:latin typeface="Arial"/>
+            </a:endParaRPr>
+          </a:p>
+          <a:p>
+            <a:pPr algn="ctr">
+              <a:lnSpc>
+                <a:spcPct val="100000"/>
+              </a:lnSpc>
+            </a:pPr>
+            <a:endParaRPr b="0" lang="pt-BR" sz="1800" spc="-1" strike="noStrike">
+              <a:latin typeface="Arial"/>
+            </a:endParaRPr>
+          </a:p>
+          <a:p>
+            <a:pPr algn="ctr">
+              <a:lnSpc>
+                <a:spcPct val="100000"/>
+              </a:lnSpc>
+            </a:pPr>
+            <a:endParaRPr b="0" lang="pt-BR" sz="1800" spc="-1" strike="noStrike">
+              <a:latin typeface="Arial"/>
+            </a:endParaRPr>
+          </a:p>
+          <a:p>
+            <a:pPr algn="ctr">
+              <a:lnSpc>
+                <a:spcPct val="100000"/>
+              </a:lnSpc>
+            </a:pPr>
+            <a:endParaRPr b="0" lang="pt-BR" sz="1800" spc="-1" strike="noStrike">
+              <a:latin typeface="Arial"/>
+            </a:endParaRPr>
+          </a:p>
+        </p:txBody>
+      </p:sp>
     </p:spTree>
   </p:cSld>
   <p:timing>
@@ -2674,7 +2847,7 @@
       </p:grpSpPr>
       <p:pic>
         <p:nvPicPr>
-          <p:cNvPr id="58" name="" descr=""/>
+          <p:cNvPr id="61" name="" descr=""/>
           <p:cNvPicPr/>
           <p:nvPr/>
         </p:nvPicPr>
@@ -2684,7 +2857,7 @@
         </p:blipFill>
         <p:spPr>
           <a:xfrm>
-            <a:off x="1033920" y="1997640"/>
+            <a:off x="1033920" y="2285640"/>
             <a:ext cx="9527760" cy="3762360"/>
           </a:xfrm>
           <a:prstGeom prst="rect">
@@ -2697,7 +2870,7 @@
       </p:pic>
       <p:sp>
         <p:nvSpPr>
-          <p:cNvPr id="59" name="CustomShape 1"/>
+          <p:cNvPr id="62" name="CustomShape 1"/>
           <p:cNvSpPr/>
           <p:nvPr/>
         </p:nvSpPr>
@@ -2725,7 +2898,7 @@
       </p:sp>
       <p:pic>
         <p:nvPicPr>
-          <p:cNvPr id="60" name="Google Shape;89;p13" descr=""/>
+          <p:cNvPr id="63" name="Google Shape;89;p13" descr=""/>
           <p:cNvPicPr/>
           <p:nvPr/>
         </p:nvPicPr>
@@ -2748,7 +2921,7 @@
       </p:pic>
       <p:sp>
         <p:nvSpPr>
-          <p:cNvPr id="61" name="CustomShape 2"/>
+          <p:cNvPr id="64" name="CustomShape 2"/>
           <p:cNvSpPr/>
           <p:nvPr/>
         </p:nvSpPr>
@@ -2807,7 +2980,7 @@
       </p:sp>
       <p:pic>
         <p:nvPicPr>
-          <p:cNvPr id="62" name="Google Shape;166;p39" descr=""/>
+          <p:cNvPr id="65" name="Google Shape;166;p39" descr=""/>
           <p:cNvPicPr/>
           <p:nvPr/>
         </p:nvPicPr>
@@ -2828,6 +3001,55 @@
           </a:ln>
         </p:spPr>
       </p:pic>
+      <p:sp>
+        <p:nvSpPr>
+          <p:cNvPr id="66" name="CustomShape 3"/>
+          <p:cNvSpPr/>
+          <p:nvPr/>
+        </p:nvSpPr>
+        <p:spPr>
+          <a:xfrm>
+            <a:off x="3422160" y="1572840"/>
+            <a:ext cx="4929840" cy="1123200"/>
+          </a:xfrm>
+          <a:prstGeom prst="rect">
+            <a:avLst/>
+          </a:prstGeom>
+          <a:noFill/>
+          <a:ln>
+            <a:noFill/>
+          </a:ln>
+        </p:spPr>
+        <p:style>
+          <a:lnRef idx="0"/>
+          <a:fillRef idx="0"/>
+          <a:effectRef idx="0"/>
+          <a:fontRef idx="minor"/>
+        </p:style>
+        <p:txBody>
+          <a:bodyPr lIns="90000" rIns="90000" tIns="45000" bIns="45000"/>
+          <a:p>
+            <a:pPr algn="ctr">
+              <a:lnSpc>
+                <a:spcPct val="100000"/>
+              </a:lnSpc>
+            </a:pPr>
+            <a:r>
+              <a:rPr b="1" lang="pt-BR" sz="3200" spc="-1" strike="noStrike">
+                <a:solidFill>
+                  <a:srgbClr val="8dc641"/>
+                </a:solidFill>
+                <a:latin typeface="Arial"/>
+                <a:ea typeface="Arial"/>
+              </a:rPr>
+              <a:t>Menu do Sistema</a:t>
+            </a:r>
+            <a:endParaRPr b="0" lang="pt-BR" sz="3200" spc="-1" strike="noStrike">
+              <a:latin typeface="Arial"/>
+            </a:endParaRPr>
+          </a:p>
+        </p:txBody>
+      </p:sp>
     </p:spTree>
   </p:cSld>
   <p:timing>
@@ -2886,7 +3108,7 @@
       </p:grpSpPr>
       <p:pic>
         <p:nvPicPr>
-          <p:cNvPr id="63" name="" descr=""/>
+          <p:cNvPr id="67" name="" descr=""/>
           <p:cNvPicPr/>
           <p:nvPr/>
         </p:nvPicPr>
@@ -2909,7 +3131,7 @@
       </p:pic>
       <p:sp>
         <p:nvSpPr>
-          <p:cNvPr id="64" name="CustomShape 1"/>
+          <p:cNvPr id="68" name="CustomShape 1"/>
           <p:cNvSpPr/>
           <p:nvPr/>
         </p:nvSpPr>
@@ -2937,7 +3159,7 @@
       </p:sp>
       <p:pic>
         <p:nvPicPr>
-          <p:cNvPr id="65" name="Google Shape;89;p13" descr=""/>
+          <p:cNvPr id="69" name="Google Shape;89;p13" descr=""/>
           <p:cNvPicPr/>
           <p:nvPr/>
         </p:nvPicPr>
@@ -2960,7 +3182,7 @@
       </p:pic>
       <p:sp>
         <p:nvSpPr>
-          <p:cNvPr id="66" name="CustomShape 2"/>
+          <p:cNvPr id="70" name="CustomShape 2"/>
           <p:cNvSpPr/>
           <p:nvPr/>
         </p:nvSpPr>
@@ -3019,7 +3241,7 @@
       </p:sp>
       <p:pic>
         <p:nvPicPr>
-          <p:cNvPr id="67" name="Google Shape;166;p39" descr=""/>
+          <p:cNvPr id="71" name="Google Shape;166;p39" descr=""/>
           <p:cNvPicPr/>
           <p:nvPr/>
         </p:nvPicPr>
@@ -3040,6 +3262,115 @@
           </a:ln>
         </p:spPr>
       </p:pic>
+      <p:sp>
+        <p:nvSpPr>
+          <p:cNvPr id="72" name="CustomShape 3"/>
+          <p:cNvSpPr/>
+          <p:nvPr/>
+        </p:nvSpPr>
+        <p:spPr>
+          <a:xfrm>
+            <a:off x="3422160" y="1536840"/>
+            <a:ext cx="4929840" cy="1123200"/>
+          </a:xfrm>
+          <a:prstGeom prst="rect">
+            <a:avLst/>
+          </a:prstGeom>
+          <a:noFill/>
+          <a:ln>
+            <a:noFill/>
+          </a:ln>
+        </p:spPr>
+        <p:style>
+          <a:lnRef idx="0"/>
+          <a:fillRef idx="0"/>
+          <a:effectRef idx="0"/>
+          <a:fontRef idx="minor"/>
+        </p:style>
+        <p:txBody>
+          <a:bodyPr lIns="90000" rIns="90000" tIns="45000" bIns="45000"/>
+          <a:p>
+            <a:pPr algn="ctr">
+              <a:lnSpc>
+                <a:spcPct val="100000"/>
+              </a:lnSpc>
+            </a:pPr>
+            <a:r>
+              <a:rPr b="1" lang="pt-BR" sz="1800" spc="-1" strike="noStrike">
+                <a:solidFill>
+                  <a:srgbClr val="8dc641"/>
+                </a:solidFill>
+                <a:latin typeface="Arial"/>
+                <a:ea typeface="Arial"/>
+              </a:rPr>
+              <a:t>Cadastro de Pacientes</a:t>
+            </a:r>
+            <a:endParaRPr b="0" lang="pt-BR" sz="1800" spc="-1" strike="noStrike">
+              <a:latin typeface="Arial"/>
+            </a:endParaRPr>
+          </a:p>
+          <a:p>
+            <a:pPr algn="ctr">
+              <a:lnSpc>
+                <a:spcPct val="100000"/>
+              </a:lnSpc>
+            </a:pPr>
+            <a:endParaRPr b="0" lang="pt-BR" sz="1800" spc="-1" strike="noStrike">
+              <a:latin typeface="Arial"/>
+            </a:endParaRPr>
+          </a:p>
+          <a:p>
+            <a:pPr algn="ctr">
+              <a:lnSpc>
+                <a:spcPct val="100000"/>
+              </a:lnSpc>
+            </a:pPr>
+            <a:endParaRPr b="0" lang="pt-BR" sz="1800" spc="-1" strike="noStrike">
+              <a:latin typeface="Arial"/>
+            </a:endParaRPr>
+          </a:p>
+          <a:p>
+            <a:pPr algn="ctr">
+              <a:lnSpc>
+                <a:spcPct val="100000"/>
+              </a:lnSpc>
+            </a:pPr>
+            <a:endParaRPr b="0" lang="pt-BR" sz="1800" spc="-1" strike="noStrike">
+              <a:latin typeface="Arial"/>
+            </a:endParaRPr>
+          </a:p>
+          <a:p>
+            <a:pPr algn="ctr">
+              <a:lnSpc>
+                <a:spcPct val="100000"/>
+              </a:lnSpc>
+            </a:pPr>
+            <a:endParaRPr b="0" lang="pt-BR" sz="1800" spc="-1" strike="noStrike">
+              <a:latin typeface="Arial"/>
+            </a:endParaRPr>
+          </a:p>
+          <a:p>
+            <a:pPr algn="ctr">
+              <a:lnSpc>
+                <a:spcPct val="100000"/>
+              </a:lnSpc>
+            </a:pPr>
+            <a:endParaRPr b="0" lang="pt-BR" sz="1800" spc="-1" strike="noStrike">
+              <a:latin typeface="Arial"/>
+            </a:endParaRPr>
+          </a:p>
+          <a:p>
+            <a:pPr algn="ctr">
+              <a:lnSpc>
+                <a:spcPct val="100000"/>
+              </a:lnSpc>
+            </a:pPr>
+            <a:endParaRPr b="0" lang="pt-BR" sz="1800" spc="-1" strike="noStrike">
+              <a:latin typeface="Arial"/>
+            </a:endParaRPr>
+          </a:p>
+        </p:txBody>
+      </p:sp>
     </p:spTree>
   </p:cSld>
   <p:timing>
@@ -3098,7 +3429,7 @@
       </p:grpSpPr>
       <p:pic>
         <p:nvPicPr>
-          <p:cNvPr id="68" name="" descr=""/>
+          <p:cNvPr id="73" name="" descr=""/>
           <p:cNvPicPr/>
           <p:nvPr/>
         </p:nvPicPr>
@@ -3108,8 +3439,8 @@
         </p:blipFill>
         <p:spPr>
           <a:xfrm>
-            <a:off x="893880" y="1872000"/>
-            <a:ext cx="10050120" cy="4384080"/>
+            <a:off x="1080000" y="1989360"/>
+            <a:ext cx="9864000" cy="4302720"/>
           </a:xfrm>
           <a:prstGeom prst="rect">
             <a:avLst/>
@@ -3121,7 +3452,7 @@
       </p:pic>
       <p:sp>
         <p:nvSpPr>
-          <p:cNvPr id="69" name="CustomShape 1"/>
+          <p:cNvPr id="74" name="CustomShape 1"/>
           <p:cNvSpPr/>
           <p:nvPr/>
         </p:nvSpPr>
@@ -3149,7 +3480,7 @@
       </p:sp>
       <p:pic>
         <p:nvPicPr>
-          <p:cNvPr id="70" name="Google Shape;89;p13" descr=""/>
+          <p:cNvPr id="75" name="Google Shape;89;p13" descr=""/>
           <p:cNvPicPr/>
           <p:nvPr/>
         </p:nvPicPr>
@@ -3172,7 +3503,7 @@
       </p:pic>
       <p:sp>
         <p:nvSpPr>
-          <p:cNvPr id="71" name="CustomShape 2"/>
+          <p:cNvPr id="76" name="CustomShape 2"/>
           <p:cNvSpPr/>
           <p:nvPr/>
         </p:nvSpPr>
@@ -3231,7 +3562,7 @@
       </p:sp>
       <p:pic>
         <p:nvPicPr>
-          <p:cNvPr id="72" name="Google Shape;166;p39" descr=""/>
+          <p:cNvPr id="77" name="Google Shape;166;p39" descr=""/>
           <p:cNvPicPr/>
           <p:nvPr/>
         </p:nvPicPr>
@@ -3252,6 +3583,115 @@
           </a:ln>
         </p:spPr>
       </p:pic>
+      <p:sp>
+        <p:nvSpPr>
+          <p:cNvPr id="78" name="CustomShape 3"/>
+          <p:cNvSpPr/>
+          <p:nvPr/>
+        </p:nvSpPr>
+        <p:spPr>
+          <a:xfrm>
+            <a:off x="3422160" y="1568880"/>
+            <a:ext cx="4929840" cy="1123200"/>
+          </a:xfrm>
+          <a:prstGeom prst="rect">
+            <a:avLst/>
+          </a:prstGeom>
+          <a:noFill/>
+          <a:ln>
+            <a:noFill/>
+          </a:ln>
+        </p:spPr>
+        <p:style>
+          <a:lnRef idx="0"/>
+          <a:fillRef idx="0"/>
+          <a:effectRef idx="0"/>
+          <a:fontRef idx="minor"/>
+        </p:style>
+        <p:txBody>
+          <a:bodyPr lIns="90000" rIns="90000" tIns="45000" bIns="45000"/>
+          <a:p>
+            <a:pPr algn="ctr">
+              <a:lnSpc>
+                <a:spcPct val="100000"/>
+              </a:lnSpc>
+            </a:pPr>
+            <a:r>
+              <a:rPr b="1" lang="pt-BR" sz="1800" spc="-1" strike="noStrike">
+                <a:solidFill>
+                  <a:srgbClr val="8dc641"/>
+                </a:solidFill>
+                <a:latin typeface="Arial"/>
+                <a:ea typeface="Arial"/>
+              </a:rPr>
+              <a:t>Cadastro de Pacientes</a:t>
+            </a:r>
+            <a:endParaRPr b="0" lang="pt-BR" sz="1800" spc="-1" strike="noStrike">
+              <a:latin typeface="Arial"/>
+            </a:endParaRPr>
+          </a:p>
+          <a:p>
+            <a:pPr algn="ctr">
+              <a:lnSpc>
+                <a:spcPct val="100000"/>
+              </a:lnSpc>
+            </a:pPr>
+            <a:endParaRPr b="0" lang="pt-BR" sz="1800" spc="-1" strike="noStrike">
+              <a:latin typeface="Arial"/>
+            </a:endParaRPr>
+          </a:p>
+          <a:p>
+            <a:pPr algn="ctr">
+              <a:lnSpc>
+                <a:spcPct val="100000"/>
+              </a:lnSpc>
+            </a:pPr>
+            <a:endParaRPr b="0" lang="pt-BR" sz="1800" spc="-1" strike="noStrike">
+              <a:latin typeface="Arial"/>
+            </a:endParaRPr>
+          </a:p>
+          <a:p>
+            <a:pPr algn="ctr">
+              <a:lnSpc>
+                <a:spcPct val="100000"/>
+              </a:lnSpc>
+            </a:pPr>
+            <a:endParaRPr b="0" lang="pt-BR" sz="1800" spc="-1" strike="noStrike">
+              <a:latin typeface="Arial"/>
+            </a:endParaRPr>
+          </a:p>
+          <a:p>
+            <a:pPr algn="ctr">
+              <a:lnSpc>
+                <a:spcPct val="100000"/>
+              </a:lnSpc>
+            </a:pPr>
+            <a:endParaRPr b="0" lang="pt-BR" sz="1800" spc="-1" strike="noStrike">
+              <a:latin typeface="Arial"/>
+            </a:endParaRPr>
+          </a:p>
+          <a:p>
+            <a:pPr algn="ctr">
+              <a:lnSpc>
+                <a:spcPct val="100000"/>
+              </a:lnSpc>
+            </a:pPr>
+            <a:endParaRPr b="0" lang="pt-BR" sz="1800" spc="-1" strike="noStrike">
+              <a:latin typeface="Arial"/>
+            </a:endParaRPr>
+          </a:p>
+          <a:p>
+            <a:pPr algn="ctr">
+              <a:lnSpc>
+                <a:spcPct val="100000"/>
+              </a:lnSpc>
+            </a:pPr>
+            <a:endParaRPr b="0" lang="pt-BR" sz="1800" spc="-1" strike="noStrike">
+              <a:latin typeface="Arial"/>
+            </a:endParaRPr>
+          </a:p>
+        </p:txBody>
+      </p:sp>
     </p:spTree>
   </p:cSld>
   <p:timing>

</xml_diff>